<commit_message>
Add slide about significance
</commit_message>
<xml_diff>
--- a/bayesian_statistics_slides.pptx
+++ b/bayesian_statistics_slides.pptx
@@ -5,7 +5,7 @@
     <p:sldMasterId id="2147483648" r:id="rId4"/>
   </p:sldMasterIdLst>
   <p:notesMasterIdLst>
-    <p:notesMasterId r:id="rId28"/>
+    <p:notesMasterId r:id="rId29"/>
   </p:notesMasterIdLst>
   <p:sldIdLst>
     <p:sldId id="351" r:id="rId5"/>
@@ -26,11 +26,12 @@
     <p:sldId id="364" r:id="rId20"/>
     <p:sldId id="366" r:id="rId21"/>
     <p:sldId id="367" r:id="rId22"/>
-    <p:sldId id="368" r:id="rId23"/>
-    <p:sldId id="343" r:id="rId24"/>
-    <p:sldId id="353" r:id="rId25"/>
-    <p:sldId id="350" r:id="rId26"/>
-    <p:sldId id="348" r:id="rId27"/>
+    <p:sldId id="372" r:id="rId23"/>
+    <p:sldId id="368" r:id="rId24"/>
+    <p:sldId id="343" r:id="rId25"/>
+    <p:sldId id="353" r:id="rId26"/>
+    <p:sldId id="350" r:id="rId27"/>
+    <p:sldId id="348" r:id="rId28"/>
   </p:sldIdLst>
   <p:sldSz cx="12192000" cy="6858000"/>
   <p:notesSz cx="6858000" cy="9144000"/>
@@ -219,7 +220,7 @@
           <a:p>
             <a:fld id="{5783EF70-B160-C544-A096-4290244F455F}" type="datetimeFigureOut">
               <a:rPr lang="en-US" smtClean="0"/>
-              <a:t>4/12/2024</a:t>
+              <a:t>4/16/2024</a:t>
             </a:fld>
             <a:endParaRPr lang="en-US"/>
           </a:p>
@@ -1210,7 +1211,10 @@
           <a:bodyPr/>
           <a:lstStyle/>
           <a:p>
-            <a:endParaRPr lang="en-GB" dirty="0"/>
+            <a:r>
+              <a:rPr lang="en-GB" dirty="0"/>
+              <a:t>To do hypothesis testing and find “evidence” for one model over another in Bayesian statistics, you need Bayes factors: we won’t cover these on this course</a:t>
+            </a:r>
           </a:p>
         </p:txBody>
       </p:sp>
@@ -1240,7 +1244,7 @@
     </p:spTree>
     <p:extLst>
       <p:ext uri="{BB962C8B-B14F-4D97-AF65-F5344CB8AC3E}">
-        <p14:creationId xmlns:p14="http://schemas.microsoft.com/office/powerpoint/2010/main" val="1602728051"/>
+        <p14:creationId xmlns:p14="http://schemas.microsoft.com/office/powerpoint/2010/main" val="2101377158"/>
       </p:ext>
     </p:extLst>
   </p:cSld>
@@ -1294,7 +1298,7 @@
           <a:bodyPr/>
           <a:lstStyle/>
           <a:p>
-            <a:endParaRPr lang="en-US" dirty="0"/>
+            <a:endParaRPr lang="en-GB" dirty="0"/>
           </a:p>
         </p:txBody>
       </p:sp>
@@ -1324,7 +1328,7 @@
     </p:spTree>
     <p:extLst>
       <p:ext uri="{BB962C8B-B14F-4D97-AF65-F5344CB8AC3E}">
-        <p14:creationId xmlns:p14="http://schemas.microsoft.com/office/powerpoint/2010/main" val="1240515911"/>
+        <p14:creationId xmlns:p14="http://schemas.microsoft.com/office/powerpoint/2010/main" val="1602728051"/>
       </p:ext>
     </p:extLst>
   </p:cSld>
@@ -1378,7 +1382,7 @@
           <a:bodyPr/>
           <a:lstStyle/>
           <a:p>
-            <a:endParaRPr lang="en-US"/>
+            <a:endParaRPr lang="en-US" dirty="0"/>
           </a:p>
         </p:txBody>
       </p:sp>
@@ -1399,7 +1403,7 @@
           <a:p>
             <a:fld id="{5BC86E30-FAB4-5B4A-8975-63EB729CF3D6}" type="slidenum">
               <a:rPr lang="en-US" smtClean="0"/>
-              <a:t>22</a:t>
+              <a:t>21</a:t>
             </a:fld>
             <a:endParaRPr lang="en-US"/>
           </a:p>
@@ -1408,7 +1412,7 @@
     </p:spTree>
     <p:extLst>
       <p:ext uri="{BB962C8B-B14F-4D97-AF65-F5344CB8AC3E}">
-        <p14:creationId xmlns:p14="http://schemas.microsoft.com/office/powerpoint/2010/main" val="180858521"/>
+        <p14:creationId xmlns:p14="http://schemas.microsoft.com/office/powerpoint/2010/main" val="1240515911"/>
       </p:ext>
     </p:extLst>
   </p:cSld>
@@ -1484,6 +1488,90 @@
             <a:fld id="{5BC86E30-FAB4-5B4A-8975-63EB729CF3D6}" type="slidenum">
               <a:rPr lang="en-US" smtClean="0"/>
               <a:t>23</a:t>
+            </a:fld>
+            <a:endParaRPr lang="en-US"/>
+          </a:p>
+        </p:txBody>
+      </p:sp>
+    </p:spTree>
+    <p:extLst>
+      <p:ext uri="{BB962C8B-B14F-4D97-AF65-F5344CB8AC3E}">
+        <p14:creationId xmlns:p14="http://schemas.microsoft.com/office/powerpoint/2010/main" val="180858521"/>
+      </p:ext>
+    </p:extLst>
+  </p:cSld>
+  <p:clrMapOvr>
+    <a:masterClrMapping/>
+  </p:clrMapOvr>
+</p:notes>
+</file>
+
+<file path=ppt/notesSlides/notesSlide17.xml><?xml version="1.0" encoding="utf-8"?>
+<p:notes xmlns:a="http://schemas.openxmlformats.org/drawingml/2006/main" xmlns:r="http://schemas.openxmlformats.org/officeDocument/2006/relationships" xmlns:p="http://schemas.openxmlformats.org/presentationml/2006/main">
+  <p:cSld>
+    <p:spTree>
+      <p:nvGrpSpPr>
+        <p:cNvPr id="1" name=""/>
+        <p:cNvGrpSpPr/>
+        <p:nvPr/>
+      </p:nvGrpSpPr>
+      <p:grpSpPr>
+        <a:xfrm>
+          <a:off x="0" y="0"/>
+          <a:ext cx="0" cy="0"/>
+          <a:chOff x="0" y="0"/>
+          <a:chExt cx="0" cy="0"/>
+        </a:xfrm>
+      </p:grpSpPr>
+      <p:sp>
+        <p:nvSpPr>
+          <p:cNvPr id="2" name="Slide Image Placeholder 1"/>
+          <p:cNvSpPr>
+            <a:spLocks noGrp="1" noRot="1" noChangeAspect="1"/>
+          </p:cNvSpPr>
+          <p:nvPr>
+            <p:ph type="sldImg"/>
+          </p:nvPr>
+        </p:nvSpPr>
+        <p:spPr/>
+      </p:sp>
+      <p:sp>
+        <p:nvSpPr>
+          <p:cNvPr id="3" name="Notes Placeholder 2"/>
+          <p:cNvSpPr>
+            <a:spLocks noGrp="1"/>
+          </p:cNvSpPr>
+          <p:nvPr>
+            <p:ph type="body" idx="1"/>
+          </p:nvPr>
+        </p:nvSpPr>
+        <p:spPr/>
+        <p:txBody>
+          <a:bodyPr/>
+          <a:lstStyle/>
+          <a:p>
+            <a:endParaRPr lang="en-US"/>
+          </a:p>
+        </p:txBody>
+      </p:sp>
+      <p:sp>
+        <p:nvSpPr>
+          <p:cNvPr id="4" name="Slide Number Placeholder 3"/>
+          <p:cNvSpPr>
+            <a:spLocks noGrp="1"/>
+          </p:cNvSpPr>
+          <p:nvPr>
+            <p:ph type="sldNum" sz="quarter" idx="5"/>
+          </p:nvPr>
+        </p:nvSpPr>
+        <p:spPr/>
+        <p:txBody>
+          <a:bodyPr/>
+          <a:lstStyle/>
+          <a:p>
+            <a:fld id="{5BC86E30-FAB4-5B4A-8975-63EB729CF3D6}" type="slidenum">
+              <a:rPr lang="en-US" smtClean="0"/>
+              <a:t>24</a:t>
             </a:fld>
             <a:endParaRPr lang="en-US"/>
           </a:p>
@@ -2323,7 +2411,7 @@
           <a:p>
             <a:fld id="{C45D44A4-BF46-4784-BC3D-5888E1A8829D}" type="datetimeFigureOut">
               <a:rPr lang="en-GB" smtClean="0"/>
-              <a:t>12/04/2024</a:t>
+              <a:t>16/04/2024</a:t>
             </a:fld>
             <a:endParaRPr lang="en-GB"/>
           </a:p>
@@ -2493,7 +2581,7 @@
           <a:p>
             <a:fld id="{C45D44A4-BF46-4784-BC3D-5888E1A8829D}" type="datetimeFigureOut">
               <a:rPr lang="en-GB" smtClean="0"/>
-              <a:t>12/04/2024</a:t>
+              <a:t>16/04/2024</a:t>
             </a:fld>
             <a:endParaRPr lang="en-GB"/>
           </a:p>
@@ -2673,7 +2761,7 @@
           <a:p>
             <a:fld id="{C45D44A4-BF46-4784-BC3D-5888E1A8829D}" type="datetimeFigureOut">
               <a:rPr lang="en-GB" smtClean="0"/>
-              <a:t>12/04/2024</a:t>
+              <a:t>16/04/2024</a:t>
             </a:fld>
             <a:endParaRPr lang="en-GB"/>
           </a:p>
@@ -2848,7 +2936,7 @@
           <a:p>
             <a:fld id="{C45D44A4-BF46-4784-BC3D-5888E1A8829D}" type="datetimeFigureOut">
               <a:rPr lang="en-GB" smtClean="0"/>
-              <a:t>12/04/2024</a:t>
+              <a:t>16/04/2024</a:t>
             </a:fld>
             <a:endParaRPr lang="en-GB"/>
           </a:p>
@@ -3094,7 +3182,7 @@
           <a:p>
             <a:fld id="{C45D44A4-BF46-4784-BC3D-5888E1A8829D}" type="datetimeFigureOut">
               <a:rPr lang="en-GB" smtClean="0"/>
-              <a:t>12/04/2024</a:t>
+              <a:t>16/04/2024</a:t>
             </a:fld>
             <a:endParaRPr lang="en-GB"/>
           </a:p>
@@ -3326,7 +3414,7 @@
           <a:p>
             <a:fld id="{C45D44A4-BF46-4784-BC3D-5888E1A8829D}" type="datetimeFigureOut">
               <a:rPr lang="en-GB" smtClean="0"/>
-              <a:t>12/04/2024</a:t>
+              <a:t>16/04/2024</a:t>
             </a:fld>
             <a:endParaRPr lang="en-GB"/>
           </a:p>
@@ -3693,7 +3781,7 @@
           <a:p>
             <a:fld id="{C45D44A4-BF46-4784-BC3D-5888E1A8829D}" type="datetimeFigureOut">
               <a:rPr lang="en-GB" smtClean="0"/>
-              <a:t>12/04/2024</a:t>
+              <a:t>16/04/2024</a:t>
             </a:fld>
             <a:endParaRPr lang="en-GB"/>
           </a:p>
@@ -3792,7 +3880,7 @@
           <a:p>
             <a:fld id="{C45D44A4-BF46-4784-BC3D-5888E1A8829D}" type="datetimeFigureOut">
               <a:rPr lang="en-GB" smtClean="0"/>
-              <a:t>12/04/2024</a:t>
+              <a:t>16/04/2024</a:t>
             </a:fld>
             <a:endParaRPr lang="en-GB"/>
           </a:p>
@@ -3887,7 +3975,7 @@
           <a:p>
             <a:fld id="{C45D44A4-BF46-4784-BC3D-5888E1A8829D}" type="datetimeFigureOut">
               <a:rPr lang="en-GB" smtClean="0"/>
-              <a:t>12/04/2024</a:t>
+              <a:t>16/04/2024</a:t>
             </a:fld>
             <a:endParaRPr lang="en-GB"/>
           </a:p>
@@ -4164,7 +4252,7 @@
           <a:p>
             <a:fld id="{C45D44A4-BF46-4784-BC3D-5888E1A8829D}" type="datetimeFigureOut">
               <a:rPr lang="en-GB" smtClean="0"/>
-              <a:t>12/04/2024</a:t>
+              <a:t>16/04/2024</a:t>
             </a:fld>
             <a:endParaRPr lang="en-GB"/>
           </a:p>
@@ -4417,7 +4505,7 @@
           <a:p>
             <a:fld id="{C45D44A4-BF46-4784-BC3D-5888E1A8829D}" type="datetimeFigureOut">
               <a:rPr lang="en-GB" smtClean="0"/>
-              <a:t>12/04/2024</a:t>
+              <a:t>16/04/2024</a:t>
             </a:fld>
             <a:endParaRPr lang="en-GB"/>
           </a:p>
@@ -4630,7 +4718,7 @@
           <a:p>
             <a:fld id="{C45D44A4-BF46-4784-BC3D-5888E1A8829D}" type="datetimeFigureOut">
               <a:rPr lang="en-GB" smtClean="0"/>
-              <a:t>12/04/2024</a:t>
+              <a:t>16/04/2024</a:t>
             </a:fld>
             <a:endParaRPr lang="en-GB"/>
           </a:p>
@@ -5322,8 +5410,8 @@
           </a:p>
         </p:txBody>
       </p:sp>
-      <mc:AlternateContent xmlns:mc="http://schemas.openxmlformats.org/markup-compatibility/2006">
-        <mc:Choice xmlns:a14="http://schemas.microsoft.com/office/drawing/2010/main" Requires="a14">
+      <mc:AlternateContent xmlns:mc="http://schemas.openxmlformats.org/markup-compatibility/2006" xmlns:a14="http://schemas.microsoft.com/office/drawing/2010/main">
+        <mc:Choice Requires="a14">
           <p:sp>
             <p:nvSpPr>
               <p:cNvPr id="7" name="Content Placeholder 2">
@@ -5575,13 +5663,7 @@
                             <a:rPr lang="en-GB" sz="2600" b="0" i="1" smtClean="0">
                               <a:latin typeface="Cambria Math" panose="02040503050406030204" pitchFamily="18" charset="0"/>
                             </a:rPr>
-                            <m:t>𝑖</m:t>
-                          </m:r>
-                          <m:r>
-                            <a:rPr lang="en-GB" sz="2600" b="0" i="1" smtClean="0">
-                              <a:latin typeface="Cambria Math" panose="02040503050406030204" pitchFamily="18" charset="0"/>
-                            </a:rPr>
-                            <m:t>𝑙𝑙𝑛𝑒𝑠𝑠</m:t>
+                            <m:t>𝑖𝑙𝑙𝑛𝑒𝑠𝑠</m:t>
                           </m:r>
                         </m:e>
                         <m:e>
@@ -5731,7 +5813,7 @@
             </p:txBody>
           </p:sp>
         </mc:Choice>
-        <mc:Fallback>
+        <mc:Fallback xmlns="">
           <p:sp>
             <p:nvSpPr>
               <p:cNvPr id="7" name="Content Placeholder 2">
@@ -6109,8 +6191,8 @@
           </a:p>
         </p:txBody>
       </p:sp>
-      <mc:AlternateContent xmlns:mc="http://schemas.openxmlformats.org/markup-compatibility/2006">
-        <mc:Choice xmlns:a14="http://schemas.microsoft.com/office/drawing/2010/main" Requires="a14">
+      <mc:AlternateContent xmlns:mc="http://schemas.openxmlformats.org/markup-compatibility/2006" xmlns:a14="http://schemas.microsoft.com/office/drawing/2010/main">
+        <mc:Choice Requires="a14">
           <p:sp>
             <p:nvSpPr>
               <p:cNvPr id="7" name="Content Placeholder 2">
@@ -6645,7 +6727,7 @@
             </p:txBody>
           </p:sp>
         </mc:Choice>
-        <mc:Fallback>
+        <mc:Fallback xmlns="">
           <p:sp>
             <p:nvSpPr>
               <p:cNvPr id="7" name="Content Placeholder 2">
@@ -6925,8 +7007,8 @@
           </a:p>
         </p:txBody>
       </p:sp>
-      <mc:AlternateContent xmlns:mc="http://schemas.openxmlformats.org/markup-compatibility/2006">
-        <mc:Choice xmlns:a14="http://schemas.microsoft.com/office/drawing/2010/main" Requires="a14">
+      <mc:AlternateContent xmlns:mc="http://schemas.openxmlformats.org/markup-compatibility/2006" xmlns:a14="http://schemas.microsoft.com/office/drawing/2010/main">
+        <mc:Choice Requires="a14">
           <p:graphicFrame>
             <p:nvGraphicFramePr>
               <p:cNvPr id="3" name="Table 2">
@@ -7222,7 +7304,7 @@
             </a:graphic>
           </p:graphicFrame>
         </mc:Choice>
-        <mc:Fallback>
+        <mc:Fallback xmlns="">
           <p:graphicFrame>
             <p:nvGraphicFramePr>
               <p:cNvPr id="3" name="Table 2">
@@ -7481,8 +7563,8 @@
           </a:p>
         </p:txBody>
       </p:sp>
-      <mc:AlternateContent xmlns:mc="http://schemas.openxmlformats.org/markup-compatibility/2006">
-        <mc:Choice xmlns:a14="http://schemas.microsoft.com/office/drawing/2010/main" Requires="a14">
+      <mc:AlternateContent xmlns:mc="http://schemas.openxmlformats.org/markup-compatibility/2006" xmlns:a14="http://schemas.microsoft.com/office/drawing/2010/main">
+        <mc:Choice Requires="a14">
           <p:graphicFrame>
             <p:nvGraphicFramePr>
               <p:cNvPr id="3" name="Table 2">
@@ -8022,7 +8104,7 @@
             </a:graphic>
           </p:graphicFrame>
         </mc:Choice>
-        <mc:Fallback>
+        <mc:Fallback xmlns="">
           <p:graphicFrame>
             <p:nvGraphicFramePr>
               <p:cNvPr id="3" name="Table 2">
@@ -8429,8 +8511,8 @@
           </a:p>
         </p:txBody>
       </p:sp>
-      <mc:AlternateContent xmlns:mc="http://schemas.openxmlformats.org/markup-compatibility/2006">
-        <mc:Choice xmlns:a14="http://schemas.microsoft.com/office/drawing/2010/main" Requires="a14">
+      <mc:AlternateContent xmlns:mc="http://schemas.openxmlformats.org/markup-compatibility/2006" xmlns:a14="http://schemas.microsoft.com/office/drawing/2010/main">
+        <mc:Choice Requires="a14">
           <p:graphicFrame>
             <p:nvGraphicFramePr>
               <p:cNvPr id="3" name="Table 2">
@@ -9199,7 +9281,7 @@
             </a:graphic>
           </p:graphicFrame>
         </mc:Choice>
-        <mc:Fallback>
+        <mc:Fallback xmlns="">
           <p:graphicFrame>
             <p:nvGraphicFramePr>
               <p:cNvPr id="3" name="Table 2">
@@ -9746,8 +9828,8 @@
           </a:p>
         </p:txBody>
       </p:sp>
-      <mc:AlternateContent xmlns:mc="http://schemas.openxmlformats.org/markup-compatibility/2006">
-        <mc:Choice xmlns:a14="http://schemas.microsoft.com/office/drawing/2010/main" Requires="a14">
+      <mc:AlternateContent xmlns:mc="http://schemas.openxmlformats.org/markup-compatibility/2006" xmlns:a14="http://schemas.microsoft.com/office/drawing/2010/main">
+        <mc:Choice Requires="a14">
           <p:graphicFrame>
             <p:nvGraphicFramePr>
               <p:cNvPr id="3" name="Table 2">
@@ -10779,7 +10861,7 @@
             </a:graphic>
           </p:graphicFrame>
         </mc:Choice>
-        <mc:Fallback>
+        <mc:Fallback xmlns="">
           <p:graphicFrame>
             <p:nvGraphicFramePr>
               <p:cNvPr id="3" name="Table 2">
@@ -12172,7 +12254,14 @@
             </a:pPr>
             <a:r>
               <a:rPr lang="en-GB" dirty="0"/>
-              <a:t>How well do experiment participants perform on a binary outcome task (correct/incorrect)?</a:t>
+              <a:t>How well do experiment participants perform on a </a:t>
+            </a:r>
+            <a:br>
+              <a:rPr lang="en-GB" dirty="0"/>
+            </a:br>
+            <a:r>
+              <a:rPr lang="en-GB" dirty="0"/>
+              <a:t>binary outcome task (correct/incorrect)?</a:t>
             </a:r>
           </a:p>
           <a:p>
@@ -12750,7 +12839,7 @@
                                         <p:tgtEl>
                                           <p:spTgt spid="7">
                                             <p:txEl>
-                                              <p:pRg st="0" end="0"/>
+                                              <p:pRg st="1" end="1"/>
                                             </p:txEl>
                                           </p:spTgt>
                                         </p:tgtEl>
@@ -12792,55 +12881,6 @@
                                     <p:set>
                                       <p:cBhvr>
                                         <p:cTn id="10" dur="1" fill="hold">
-                                          <p:stCondLst>
-                                            <p:cond delay="0"/>
-                                          </p:stCondLst>
-                                        </p:cTn>
-                                        <p:tgtEl>
-                                          <p:spTgt spid="7">
-                                            <p:txEl>
-                                              <p:pRg st="1" end="1"/>
-                                            </p:txEl>
-                                          </p:spTgt>
-                                        </p:tgtEl>
-                                        <p:attrNameLst>
-                                          <p:attrName>style.visibility</p:attrName>
-                                        </p:attrNameLst>
-                                      </p:cBhvr>
-                                      <p:to>
-                                        <p:strVal val="visible"/>
-                                      </p:to>
-                                    </p:set>
-                                  </p:childTnLst>
-                                </p:cTn>
-                              </p:par>
-                            </p:childTnLst>
-                          </p:cTn>
-                        </p:par>
-                      </p:childTnLst>
-                    </p:cTn>
-                  </p:par>
-                  <p:par>
-                    <p:cTn id="11" fill="hold">
-                      <p:stCondLst>
-                        <p:cond delay="indefinite"/>
-                      </p:stCondLst>
-                      <p:childTnLst>
-                        <p:par>
-                          <p:cTn id="12" fill="hold">
-                            <p:stCondLst>
-                              <p:cond delay="0"/>
-                            </p:stCondLst>
-                            <p:childTnLst>
-                              <p:par>
-                                <p:cTn id="13" presetID="1" presetClass="entr" presetSubtype="0" fill="hold" nodeType="clickEffect">
-                                  <p:stCondLst>
-                                    <p:cond delay="0"/>
-                                  </p:stCondLst>
-                                  <p:childTnLst>
-                                    <p:set>
-                                      <p:cBhvr>
-                                        <p:cTn id="14" dur="1" fill="hold">
                                           <p:stCondLst>
                                             <p:cond delay="0"/>
                                           </p:stCondLst>
@@ -12957,7 +12997,7 @@
         </p:nvSpPr>
         <p:spPr>
           <a:xfrm>
-            <a:off x="838200" y="1610063"/>
+            <a:off x="838200" y="1566863"/>
             <a:ext cx="10515600" cy="4030107"/>
           </a:xfrm>
           <a:prstGeom prst="rect">
@@ -13151,60 +13191,77 @@
             </a:pPr>
             <a:r>
               <a:rPr lang="en-GB" dirty="0"/>
-              <a:t>So how do we use Bayes’ rule to arrive at a probability distribution over plausible values for our parameter(s)?</a:t>
-            </a:r>
-          </a:p>
-          <a:p>
-            <a:pPr marL="0" indent="0">
+              <a:t>This also means that there is </a:t>
+            </a:r>
+            <a:r>
+              <a:rPr lang="en-GB" b="1" dirty="0"/>
+              <a:t>no concept of significance</a:t>
+            </a:r>
+            <a:r>
+              <a:rPr lang="en-GB" dirty="0"/>
+              <a:t> </a:t>
+            </a:r>
+            <a:br>
+              <a:rPr lang="en-GB" dirty="0"/>
+            </a:br>
+            <a:r>
+              <a:rPr lang="en-GB" dirty="0"/>
+              <a:t>in Bayesian statistics!</a:t>
+            </a:r>
+          </a:p>
+          <a:p>
+            <a:pPr>
               <a:spcAft>
                 <a:spcPts val="600"/>
               </a:spcAft>
-              <a:buNone/>
             </a:pPr>
-            <a:endParaRPr lang="en-GB" dirty="0"/>
-          </a:p>
-          <a:p>
-            <a:pPr marL="0" indent="0">
+            <a:r>
+              <a:rPr lang="en-GB" dirty="0"/>
+              <a:t>Models allocate their beliefs over a range of possible values</a:t>
+            </a:r>
+          </a:p>
+          <a:p>
+            <a:pPr>
               <a:spcAft>
                 <a:spcPts val="600"/>
               </a:spcAft>
-              <a:buNone/>
             </a:pPr>
             <a:r>
               <a:rPr lang="en-GB" dirty="0"/>
-              <a:t>We combine our data with our prior assumptions about plausible values for each parameter.</a:t>
-            </a:r>
-          </a:p>
-          <a:p>
-            <a:pPr marL="0" indent="0">
+              <a:t>We observe the extent to which model estimates are </a:t>
+            </a:r>
+            <a:br>
+              <a:rPr lang="en-GB" dirty="0"/>
+            </a:br>
+            <a:r>
+              <a:rPr lang="en-GB" dirty="0"/>
+              <a:t>consistent with our hypotheses</a:t>
+            </a:r>
+          </a:p>
+          <a:p>
+            <a:pPr>
               <a:spcAft>
                 <a:spcPts val="600"/>
               </a:spcAft>
-              <a:buNone/>
             </a:pPr>
-            <a:endParaRPr lang="en-GB" dirty="0"/>
-          </a:p>
-          <a:p>
-            <a:pPr marL="0" indent="0">
-              <a:spcAft>
-                <a:spcPts val="600"/>
-              </a:spcAft>
-              <a:buNone/>
-            </a:pPr>
-            <a:r>
-              <a:rPr lang="en-GB" dirty="0">
-                <a:hlinkClick r:id="rId3"/>
-              </a:rPr>
-              <a:t>Let’s look at this process in more detail.</a:t>
-            </a:r>
-            <a:endParaRPr lang="en-GB" dirty="0"/>
+            <a:r>
+              <a:rPr lang="en-GB" dirty="0"/>
+              <a:t>But this is not a binary decision (reject the null vs. </a:t>
+            </a:r>
+            <a:br>
+              <a:rPr lang="en-GB" dirty="0"/>
+            </a:br>
+            <a:r>
+              <a:rPr lang="en-GB" dirty="0"/>
+              <a:t>fail to reject the null, as in frequentist statistics)</a:t>
+            </a:r>
           </a:p>
         </p:txBody>
       </p:sp>
     </p:spTree>
     <p:extLst>
       <p:ext uri="{BB962C8B-B14F-4D97-AF65-F5344CB8AC3E}">
-        <p14:creationId xmlns:p14="http://schemas.microsoft.com/office/powerpoint/2010/main" val="3920446878"/>
+        <p14:creationId xmlns:p14="http://schemas.microsoft.com/office/powerpoint/2010/main" val="597337140"/>
       </p:ext>
     </p:extLst>
   </p:cSld>
@@ -13247,7 +13304,7 @@
                                         <p:tgtEl>
                                           <p:spTgt spid="7">
                                             <p:txEl>
-                                              <p:pRg st="2" end="2"/>
+                                              <p:pRg st="1" end="1"/>
                                             </p:txEl>
                                           </p:spTgt>
                                         </p:tgtEl>
@@ -13296,7 +13353,56 @@
                                         <p:tgtEl>
                                           <p:spTgt spid="7">
                                             <p:txEl>
-                                              <p:pRg st="4" end="4"/>
+                                              <p:pRg st="2" end="2"/>
+                                            </p:txEl>
+                                          </p:spTgt>
+                                        </p:tgtEl>
+                                        <p:attrNameLst>
+                                          <p:attrName>style.visibility</p:attrName>
+                                        </p:attrNameLst>
+                                      </p:cBhvr>
+                                      <p:to>
+                                        <p:strVal val="visible"/>
+                                      </p:to>
+                                    </p:set>
+                                  </p:childTnLst>
+                                </p:cTn>
+                              </p:par>
+                            </p:childTnLst>
+                          </p:cTn>
+                        </p:par>
+                      </p:childTnLst>
+                    </p:cTn>
+                  </p:par>
+                  <p:par>
+                    <p:cTn id="11" fill="hold">
+                      <p:stCondLst>
+                        <p:cond delay="indefinite"/>
+                      </p:stCondLst>
+                      <p:childTnLst>
+                        <p:par>
+                          <p:cTn id="12" fill="hold">
+                            <p:stCondLst>
+                              <p:cond delay="0"/>
+                            </p:stCondLst>
+                            <p:childTnLst>
+                              <p:par>
+                                <p:cTn id="13" presetID="1" presetClass="entr" presetSubtype="0" fill="hold" nodeType="clickEffect">
+                                  <p:stCondLst>
+                                    <p:cond delay="0"/>
+                                  </p:stCondLst>
+                                  <p:childTnLst>
+                                    <p:set>
+                                      <p:cBhvr>
+                                        <p:cTn id="14" dur="1" fill="hold">
+                                          <p:stCondLst>
+                                            <p:cond delay="0"/>
+                                          </p:stCondLst>
+                                        </p:cTn>
+                                        <p:tgtEl>
+                                          <p:spTgt spid="7">
+                                            <p:txEl>
+                                              <p:pRg st="3" end="3"/>
                                             </p:txEl>
                                           </p:spTgt>
                                         </p:tgtEl>
@@ -13740,6 +13846,454 @@
           <p:cNvPr id="2" name="Title 1">
             <a:extLst>
               <a:ext uri="{FF2B5EF4-FFF2-40B4-BE49-F238E27FC236}">
+                <a16:creationId xmlns:a16="http://schemas.microsoft.com/office/drawing/2014/main" id="{7DA56100-3C18-37F5-03C9-B26C74428731}"/>
+              </a:ext>
+            </a:extLst>
+          </p:cNvPr>
+          <p:cNvSpPr>
+            <a:spLocks noGrp="1"/>
+          </p:cNvSpPr>
+          <p:nvPr>
+            <p:ph type="title"/>
+          </p:nvPr>
+        </p:nvSpPr>
+        <p:spPr/>
+        <p:txBody>
+          <a:bodyPr>
+            <a:normAutofit/>
+          </a:bodyPr>
+          <a:lstStyle/>
+          <a:p>
+            <a:r>
+              <a:rPr lang="en-GB" dirty="0"/>
+              <a:t>Bayesian inference for statistics</a:t>
+            </a:r>
+          </a:p>
+        </p:txBody>
+      </p:sp>
+      <p:sp>
+        <p:nvSpPr>
+          <p:cNvPr id="7" name="Content Placeholder 2">
+            <a:extLst>
+              <a:ext uri="{FF2B5EF4-FFF2-40B4-BE49-F238E27FC236}">
+                <a16:creationId xmlns:a16="http://schemas.microsoft.com/office/drawing/2014/main" id="{56097F04-96B6-3FD9-C9D8-AF165AF28D97}"/>
+              </a:ext>
+            </a:extLst>
+          </p:cNvPr>
+          <p:cNvSpPr txBox="1">
+            <a:spLocks/>
+          </p:cNvSpPr>
+          <p:nvPr/>
+        </p:nvSpPr>
+        <p:spPr>
+          <a:xfrm>
+            <a:off x="838200" y="1610063"/>
+            <a:ext cx="10515600" cy="4030107"/>
+          </a:xfrm>
+          <a:prstGeom prst="rect">
+            <a:avLst/>
+          </a:prstGeom>
+        </p:spPr>
+        <p:txBody>
+          <a:bodyPr vert="horz" lIns="91440" tIns="45720" rIns="91440" bIns="45720" rtlCol="0">
+            <a:normAutofit/>
+          </a:bodyPr>
+          <a:lstStyle>
+            <a:lvl1pPr marL="228600" indent="-228600" algn="l" defTabSz="914400" rtl="0" eaLnBrk="1" latinLnBrk="0" hangingPunct="1">
+              <a:lnSpc>
+                <a:spcPct val="90000"/>
+              </a:lnSpc>
+              <a:spcBef>
+                <a:spcPts val="1000"/>
+              </a:spcBef>
+              <a:buFont typeface="Arial" panose="020B0604020202020204" pitchFamily="34" charset="0"/>
+              <a:buChar char="•"/>
+              <a:defRPr sz="2800" kern="1200">
+                <a:solidFill>
+                  <a:schemeClr val="accent5">
+                    <a:lumMod val="50000"/>
+                  </a:schemeClr>
+                </a:solidFill>
+                <a:latin typeface="Source Sans Pro" panose="020B0503030403020204" pitchFamily="34" charset="0"/>
+                <a:ea typeface="Source Sans Pro" panose="020B0503030403020204" pitchFamily="34" charset="0"/>
+                <a:cs typeface="+mn-cs"/>
+              </a:defRPr>
+            </a:lvl1pPr>
+            <a:lvl2pPr marL="685800" indent="-228600" algn="l" defTabSz="914400" rtl="0" eaLnBrk="1" latinLnBrk="0" hangingPunct="1">
+              <a:lnSpc>
+                <a:spcPct val="90000"/>
+              </a:lnSpc>
+              <a:spcBef>
+                <a:spcPts val="500"/>
+              </a:spcBef>
+              <a:buFont typeface="Arial" panose="020B0604020202020204" pitchFamily="34" charset="0"/>
+              <a:buChar char="•"/>
+              <a:defRPr sz="2400" kern="1200">
+                <a:solidFill>
+                  <a:schemeClr val="accent5">
+                    <a:lumMod val="50000"/>
+                  </a:schemeClr>
+                </a:solidFill>
+                <a:latin typeface="Source Sans Pro" panose="020B0503030403020204" pitchFamily="34" charset="0"/>
+                <a:ea typeface="Source Sans Pro" panose="020B0503030403020204" pitchFamily="34" charset="0"/>
+                <a:cs typeface="+mn-cs"/>
+              </a:defRPr>
+            </a:lvl2pPr>
+            <a:lvl3pPr marL="1143000" indent="-228600" algn="l" defTabSz="914400" rtl="0" eaLnBrk="1" latinLnBrk="0" hangingPunct="1">
+              <a:lnSpc>
+                <a:spcPct val="90000"/>
+              </a:lnSpc>
+              <a:spcBef>
+                <a:spcPts val="500"/>
+              </a:spcBef>
+              <a:buFont typeface="Arial" panose="020B0604020202020204" pitchFamily="34" charset="0"/>
+              <a:buChar char="•"/>
+              <a:defRPr sz="2000" kern="1200">
+                <a:solidFill>
+                  <a:schemeClr val="accent5">
+                    <a:lumMod val="50000"/>
+                  </a:schemeClr>
+                </a:solidFill>
+                <a:latin typeface="Source Sans Pro" panose="020B0503030403020204" pitchFamily="34" charset="0"/>
+                <a:ea typeface="Source Sans Pro" panose="020B0503030403020204" pitchFamily="34" charset="0"/>
+                <a:cs typeface="+mn-cs"/>
+              </a:defRPr>
+            </a:lvl3pPr>
+            <a:lvl4pPr marL="1600200" indent="-228600" algn="l" defTabSz="914400" rtl="0" eaLnBrk="1" latinLnBrk="0" hangingPunct="1">
+              <a:lnSpc>
+                <a:spcPct val="90000"/>
+              </a:lnSpc>
+              <a:spcBef>
+                <a:spcPts val="500"/>
+              </a:spcBef>
+              <a:buFont typeface="Arial" panose="020B0604020202020204" pitchFamily="34" charset="0"/>
+              <a:buChar char="•"/>
+              <a:defRPr sz="1800" kern="1200">
+                <a:solidFill>
+                  <a:schemeClr val="accent5">
+                    <a:lumMod val="50000"/>
+                  </a:schemeClr>
+                </a:solidFill>
+                <a:latin typeface="Source Sans Pro" panose="020B0503030403020204" pitchFamily="34" charset="0"/>
+                <a:ea typeface="Source Sans Pro" panose="020B0503030403020204" pitchFamily="34" charset="0"/>
+                <a:cs typeface="+mn-cs"/>
+              </a:defRPr>
+            </a:lvl4pPr>
+            <a:lvl5pPr marL="2057400" indent="-228600" algn="l" defTabSz="914400" rtl="0" eaLnBrk="1" latinLnBrk="0" hangingPunct="1">
+              <a:lnSpc>
+                <a:spcPct val="90000"/>
+              </a:lnSpc>
+              <a:spcBef>
+                <a:spcPts val="500"/>
+              </a:spcBef>
+              <a:buFont typeface="Arial" panose="020B0604020202020204" pitchFamily="34" charset="0"/>
+              <a:buChar char="•"/>
+              <a:defRPr sz="1800" kern="1200">
+                <a:solidFill>
+                  <a:schemeClr val="accent5">
+                    <a:lumMod val="50000"/>
+                  </a:schemeClr>
+                </a:solidFill>
+                <a:latin typeface="Source Sans Pro" panose="020B0503030403020204" pitchFamily="34" charset="0"/>
+                <a:ea typeface="Source Sans Pro" panose="020B0503030403020204" pitchFamily="34" charset="0"/>
+                <a:cs typeface="+mn-cs"/>
+              </a:defRPr>
+            </a:lvl5pPr>
+            <a:lvl6pPr marL="2514600" indent="-228600" algn="l" defTabSz="914400" rtl="0" eaLnBrk="1" latinLnBrk="0" hangingPunct="1">
+              <a:lnSpc>
+                <a:spcPct val="90000"/>
+              </a:lnSpc>
+              <a:spcBef>
+                <a:spcPts val="500"/>
+              </a:spcBef>
+              <a:buFont typeface="Arial" panose="020B0604020202020204" pitchFamily="34" charset="0"/>
+              <a:buChar char="•"/>
+              <a:defRPr sz="1800" kern="1200">
+                <a:solidFill>
+                  <a:schemeClr val="tx1"/>
+                </a:solidFill>
+                <a:latin typeface="+mn-lt"/>
+                <a:ea typeface="+mn-ea"/>
+                <a:cs typeface="+mn-cs"/>
+              </a:defRPr>
+            </a:lvl6pPr>
+            <a:lvl7pPr marL="2971800" indent="-228600" algn="l" defTabSz="914400" rtl="0" eaLnBrk="1" latinLnBrk="0" hangingPunct="1">
+              <a:lnSpc>
+                <a:spcPct val="90000"/>
+              </a:lnSpc>
+              <a:spcBef>
+                <a:spcPts val="500"/>
+              </a:spcBef>
+              <a:buFont typeface="Arial" panose="020B0604020202020204" pitchFamily="34" charset="0"/>
+              <a:buChar char="•"/>
+              <a:defRPr sz="1800" kern="1200">
+                <a:solidFill>
+                  <a:schemeClr val="tx1"/>
+                </a:solidFill>
+                <a:latin typeface="+mn-lt"/>
+                <a:ea typeface="+mn-ea"/>
+                <a:cs typeface="+mn-cs"/>
+              </a:defRPr>
+            </a:lvl7pPr>
+            <a:lvl8pPr marL="3429000" indent="-228600" algn="l" defTabSz="914400" rtl="0" eaLnBrk="1" latinLnBrk="0" hangingPunct="1">
+              <a:lnSpc>
+                <a:spcPct val="90000"/>
+              </a:lnSpc>
+              <a:spcBef>
+                <a:spcPts val="500"/>
+              </a:spcBef>
+              <a:buFont typeface="Arial" panose="020B0604020202020204" pitchFamily="34" charset="0"/>
+              <a:buChar char="•"/>
+              <a:defRPr sz="1800" kern="1200">
+                <a:solidFill>
+                  <a:schemeClr val="tx1"/>
+                </a:solidFill>
+                <a:latin typeface="+mn-lt"/>
+                <a:ea typeface="+mn-ea"/>
+                <a:cs typeface="+mn-cs"/>
+              </a:defRPr>
+            </a:lvl8pPr>
+            <a:lvl9pPr marL="3886200" indent="-228600" algn="l" defTabSz="914400" rtl="0" eaLnBrk="1" latinLnBrk="0" hangingPunct="1">
+              <a:lnSpc>
+                <a:spcPct val="90000"/>
+              </a:lnSpc>
+              <a:spcBef>
+                <a:spcPts val="500"/>
+              </a:spcBef>
+              <a:buFont typeface="Arial" panose="020B0604020202020204" pitchFamily="34" charset="0"/>
+              <a:buChar char="•"/>
+              <a:defRPr sz="1800" kern="1200">
+                <a:solidFill>
+                  <a:schemeClr val="tx1"/>
+                </a:solidFill>
+                <a:latin typeface="+mn-lt"/>
+                <a:ea typeface="+mn-ea"/>
+                <a:cs typeface="+mn-cs"/>
+              </a:defRPr>
+            </a:lvl9pPr>
+          </a:lstStyle>
+          <a:p>
+            <a:pPr marL="0" indent="0">
+              <a:spcAft>
+                <a:spcPts val="600"/>
+              </a:spcAft>
+              <a:buNone/>
+            </a:pPr>
+            <a:r>
+              <a:rPr lang="en-GB" dirty="0"/>
+              <a:t>So how do we use Bayes’ rule to arrive at a probability distribution over plausible values for our parameter(s)?</a:t>
+            </a:r>
+          </a:p>
+          <a:p>
+            <a:pPr marL="0" indent="0">
+              <a:spcAft>
+                <a:spcPts val="600"/>
+              </a:spcAft>
+              <a:buNone/>
+            </a:pPr>
+            <a:endParaRPr lang="en-GB" dirty="0"/>
+          </a:p>
+          <a:p>
+            <a:pPr marL="0" indent="0">
+              <a:spcAft>
+                <a:spcPts val="600"/>
+              </a:spcAft>
+              <a:buNone/>
+            </a:pPr>
+            <a:r>
+              <a:rPr lang="en-GB" dirty="0"/>
+              <a:t>We combine our data with our prior assumptions about plausible values for each parameter.</a:t>
+            </a:r>
+          </a:p>
+          <a:p>
+            <a:pPr marL="0" indent="0">
+              <a:spcAft>
+                <a:spcPts val="600"/>
+              </a:spcAft>
+              <a:buNone/>
+            </a:pPr>
+            <a:endParaRPr lang="en-GB" dirty="0"/>
+          </a:p>
+          <a:p>
+            <a:pPr marL="0" indent="0">
+              <a:spcAft>
+                <a:spcPts val="600"/>
+              </a:spcAft>
+              <a:buNone/>
+            </a:pPr>
+            <a:r>
+              <a:rPr lang="en-GB" dirty="0">
+                <a:hlinkClick r:id="rId3"/>
+              </a:rPr>
+              <a:t>Let’s look at this process in more detail.</a:t>
+            </a:r>
+            <a:endParaRPr lang="en-GB" dirty="0"/>
+          </a:p>
+        </p:txBody>
+      </p:sp>
+    </p:spTree>
+    <p:extLst>
+      <p:ext uri="{BB962C8B-B14F-4D97-AF65-F5344CB8AC3E}">
+        <p14:creationId xmlns:p14="http://schemas.microsoft.com/office/powerpoint/2010/main" val="3920446878"/>
+      </p:ext>
+    </p:extLst>
+  </p:cSld>
+  <p:clrMapOvr>
+    <a:masterClrMapping/>
+  </p:clrMapOvr>
+  <p:timing>
+    <p:tnLst>
+      <p:par>
+        <p:cTn id="1" dur="indefinite" restart="never" nodeType="tmRoot">
+          <p:childTnLst>
+            <p:seq concurrent="1" nextAc="seek">
+              <p:cTn id="2" dur="indefinite" nodeType="mainSeq">
+                <p:childTnLst>
+                  <p:par>
+                    <p:cTn id="3" fill="hold">
+                      <p:stCondLst>
+                        <p:cond delay="indefinite"/>
+                      </p:stCondLst>
+                      <p:childTnLst>
+                        <p:par>
+                          <p:cTn id="4" fill="hold">
+                            <p:stCondLst>
+                              <p:cond delay="0"/>
+                            </p:stCondLst>
+                            <p:childTnLst>
+                              <p:par>
+                                <p:cTn id="5" presetID="1" presetClass="entr" presetSubtype="0" fill="hold" nodeType="clickEffect">
+                                  <p:stCondLst>
+                                    <p:cond delay="0"/>
+                                  </p:stCondLst>
+                                  <p:childTnLst>
+                                    <p:set>
+                                      <p:cBhvr>
+                                        <p:cTn id="6" dur="1" fill="hold">
+                                          <p:stCondLst>
+                                            <p:cond delay="0"/>
+                                          </p:stCondLst>
+                                        </p:cTn>
+                                        <p:tgtEl>
+                                          <p:spTgt spid="7">
+                                            <p:txEl>
+                                              <p:pRg st="2" end="2"/>
+                                            </p:txEl>
+                                          </p:spTgt>
+                                        </p:tgtEl>
+                                        <p:attrNameLst>
+                                          <p:attrName>style.visibility</p:attrName>
+                                        </p:attrNameLst>
+                                      </p:cBhvr>
+                                      <p:to>
+                                        <p:strVal val="visible"/>
+                                      </p:to>
+                                    </p:set>
+                                  </p:childTnLst>
+                                </p:cTn>
+                              </p:par>
+                            </p:childTnLst>
+                          </p:cTn>
+                        </p:par>
+                      </p:childTnLst>
+                    </p:cTn>
+                  </p:par>
+                  <p:par>
+                    <p:cTn id="7" fill="hold">
+                      <p:stCondLst>
+                        <p:cond delay="indefinite"/>
+                      </p:stCondLst>
+                      <p:childTnLst>
+                        <p:par>
+                          <p:cTn id="8" fill="hold">
+                            <p:stCondLst>
+                              <p:cond delay="0"/>
+                            </p:stCondLst>
+                            <p:childTnLst>
+                              <p:par>
+                                <p:cTn id="9" presetID="1" presetClass="entr" presetSubtype="0" fill="hold" nodeType="clickEffect">
+                                  <p:stCondLst>
+                                    <p:cond delay="0"/>
+                                  </p:stCondLst>
+                                  <p:childTnLst>
+                                    <p:set>
+                                      <p:cBhvr>
+                                        <p:cTn id="10" dur="1" fill="hold">
+                                          <p:stCondLst>
+                                            <p:cond delay="0"/>
+                                          </p:stCondLst>
+                                        </p:cTn>
+                                        <p:tgtEl>
+                                          <p:spTgt spid="7">
+                                            <p:txEl>
+                                              <p:pRg st="4" end="4"/>
+                                            </p:txEl>
+                                          </p:spTgt>
+                                        </p:tgtEl>
+                                        <p:attrNameLst>
+                                          <p:attrName>style.visibility</p:attrName>
+                                        </p:attrNameLst>
+                                      </p:cBhvr>
+                                      <p:to>
+                                        <p:strVal val="visible"/>
+                                      </p:to>
+                                    </p:set>
+                                  </p:childTnLst>
+                                </p:cTn>
+                              </p:par>
+                            </p:childTnLst>
+                          </p:cTn>
+                        </p:par>
+                      </p:childTnLst>
+                    </p:cTn>
+                  </p:par>
+                </p:childTnLst>
+              </p:cTn>
+              <p:prevCondLst>
+                <p:cond evt="onPrev" delay="0">
+                  <p:tgtEl>
+                    <p:sldTgt/>
+                  </p:tgtEl>
+                </p:cond>
+              </p:prevCondLst>
+              <p:nextCondLst>
+                <p:cond evt="onNext" delay="0">
+                  <p:tgtEl>
+                    <p:sldTgt/>
+                  </p:tgtEl>
+                </p:cond>
+              </p:nextCondLst>
+            </p:seq>
+          </p:childTnLst>
+        </p:cTn>
+      </p:par>
+    </p:tnLst>
+  </p:timing>
+</p:sld>
+</file>
+
+<file path=ppt/slides/slide21.xml><?xml version="1.0" encoding="utf-8"?>
+<p:sld xmlns:a="http://schemas.openxmlformats.org/drawingml/2006/main" xmlns:r="http://schemas.openxmlformats.org/officeDocument/2006/relationships" xmlns:p="http://schemas.openxmlformats.org/presentationml/2006/main">
+  <p:cSld>
+    <p:spTree>
+      <p:nvGrpSpPr>
+        <p:cNvPr id="1" name=""/>
+        <p:cNvGrpSpPr/>
+        <p:nvPr/>
+      </p:nvGrpSpPr>
+      <p:grpSpPr>
+        <a:xfrm>
+          <a:off x="0" y="0"/>
+          <a:ext cx="0" cy="0"/>
+          <a:chOff x="0" y="0"/>
+          <a:chExt cx="0" cy="0"/>
+        </a:xfrm>
+      </p:grpSpPr>
+      <p:sp>
+        <p:nvSpPr>
+          <p:cNvPr id="2" name="Title 1">
+            <a:extLst>
+              <a:ext uri="{FF2B5EF4-FFF2-40B4-BE49-F238E27FC236}">
                 <a16:creationId xmlns:a16="http://schemas.microsoft.com/office/drawing/2014/main" id="{7DBBEFCB-8C02-C9D0-3864-36BA1C00C082}"/>
               </a:ext>
             </a:extLst>
@@ -13919,7 +14473,7 @@
 </p:sld>
 </file>
 
-<file path=ppt/slides/slide21.xml><?xml version="1.0" encoding="utf-8"?>
+<file path=ppt/slides/slide22.xml><?xml version="1.0" encoding="utf-8"?>
 <p:sld xmlns:a="http://schemas.openxmlformats.org/drawingml/2006/main" xmlns:r="http://schemas.openxmlformats.org/officeDocument/2006/relationships" xmlns:p="http://schemas.openxmlformats.org/presentationml/2006/main">
   <p:cSld>
     <p:spTree>
@@ -14074,7 +14628,7 @@
 </p:sld>
 </file>
 
-<file path=ppt/slides/slide22.xml><?xml version="1.0" encoding="utf-8"?>
+<file path=ppt/slides/slide23.xml><?xml version="1.0" encoding="utf-8"?>
 <p:sld xmlns:a="http://schemas.openxmlformats.org/drawingml/2006/main" xmlns:r="http://schemas.openxmlformats.org/officeDocument/2006/relationships" xmlns:p="http://schemas.openxmlformats.org/presentationml/2006/main">
   <p:cSld>
     <p:spTree>
@@ -14410,7 +14964,7 @@
 </p:sld>
 </file>
 
-<file path=ppt/slides/slide23.xml><?xml version="1.0" encoding="utf-8"?>
+<file path=ppt/slides/slide24.xml><?xml version="1.0" encoding="utf-8"?>
 <p:sld xmlns:a="http://schemas.openxmlformats.org/drawingml/2006/main" xmlns:r="http://schemas.openxmlformats.org/officeDocument/2006/relationships" xmlns:p="http://schemas.openxmlformats.org/presentationml/2006/main">
   <p:cSld>
     <p:spTree>
@@ -18107,15 +18661,6 @@
 </file>
 
 <file path=customXml/item1.xml><?xml version="1.0" encoding="utf-8"?>
-<?mso-contentType ?>
-<FormTemplates xmlns="http://schemas.microsoft.com/sharepoint/v3/contenttype/forms">
-  <Display>DocumentLibraryForm</Display>
-  <Edit>DocumentLibraryForm</Edit>
-  <New>DocumentLibraryForm</New>
-</FormTemplates>
-</file>
-
-<file path=customXml/item2.xml><?xml version="1.0" encoding="utf-8"?>
 <ct:contentTypeSchema xmlns:ct="http://schemas.microsoft.com/office/2006/metadata/contentType" xmlns:ma="http://schemas.microsoft.com/office/2006/metadata/properties/metaAttributes" ct:_="" ma:_="" ma:contentTypeName="Document" ma:contentTypeID="0x010100200489ED7B15D140964AF1E4EBF23989" ma:contentTypeVersion="2" ma:contentTypeDescription="Create a new document." ma:contentTypeScope="" ma:versionID="a798f76a8c7c0ad7549d5b65b0487f2e">
   <xsd:schema xmlns:xsd="http://www.w3.org/2001/XMLSchema" xmlns:xs="http://www.w3.org/2001/XMLSchema" xmlns:p="http://schemas.microsoft.com/office/2006/metadata/properties" xmlns:ns2="5d257c4e-d958-453b-b0e5-15f0de6dfce7" targetNamespace="http://schemas.microsoft.com/office/2006/metadata/properties" ma:root="true" ma:fieldsID="e643076967470f79fc751b2821d7c767" ns2:_="">
     <xsd:import namespace="5d257c4e-d958-453b-b0e5-15f0de6dfce7"/>
@@ -18247,6 +18792,15 @@
 </ct:contentTypeSchema>
 </file>
 
+<file path=customXml/item2.xml><?xml version="1.0" encoding="utf-8"?>
+<?mso-contentType ?>
+<FormTemplates xmlns="http://schemas.microsoft.com/sharepoint/v3/contenttype/forms">
+  <Display>DocumentLibraryForm</Display>
+  <Edit>DocumentLibraryForm</Edit>
+  <New>DocumentLibraryForm</New>
+</FormTemplates>
+</file>
+
 <file path=customXml/item3.xml><?xml version="1.0" encoding="utf-8"?>
 <p:properties xmlns:p="http://schemas.microsoft.com/office/2006/metadata/properties" xmlns:xsi="http://www.w3.org/2001/XMLSchema-instance" xmlns:pc="http://schemas.microsoft.com/office/infopath/2007/PartnerControls">
   <documentManagement/>
@@ -18254,14 +18808,6 @@
 </file>
 
 <file path=customXml/itemProps1.xml><?xml version="1.0" encoding="utf-8"?>
-<ds:datastoreItem xmlns:ds="http://schemas.openxmlformats.org/officeDocument/2006/customXml" ds:itemID="{00170929-63CF-426D-951F-B184E207E292}">
-  <ds:schemaRefs>
-    <ds:schemaRef ds:uri="http://schemas.microsoft.com/sharepoint/v3/contenttype/forms"/>
-  </ds:schemaRefs>
-</ds:datastoreItem>
-</file>
-
-<file path=customXml/itemProps2.xml><?xml version="1.0" encoding="utf-8"?>
 <ds:datastoreItem xmlns:ds="http://schemas.openxmlformats.org/officeDocument/2006/customXml" ds:itemID="{69C8C6B8-594B-42E4-9B71-0637FB9782F6}">
   <ds:schemaRefs>
     <ds:schemaRef ds:uri="5d257c4e-d958-453b-b0e5-15f0de6dfce7"/>
@@ -18275,6 +18821,14 @@
     <ds:schemaRef ds:uri="http://schemas.microsoft.com/office/infopath/2007/PartnerControls"/>
     <ds:schemaRef ds:uri="http://schemas.openxmlformats.org/package/2006/metadata/core-properties"/>
     <ds:schemaRef ds:uri="http://www.w3.org/2001/XMLSchema"/>
+  </ds:schemaRefs>
+</ds:datastoreItem>
+</file>
+
+<file path=customXml/itemProps2.xml><?xml version="1.0" encoding="utf-8"?>
+<ds:datastoreItem xmlns:ds="http://schemas.openxmlformats.org/officeDocument/2006/customXml" ds:itemID="{00170929-63CF-426D-951F-B184E207E292}">
+  <ds:schemaRefs>
+    <ds:schemaRef ds:uri="http://schemas.microsoft.com/sharepoint/v3/contenttype/forms"/>
   </ds:schemaRefs>
 </ds:datastoreItem>
 </file>

</xml_diff>

<commit_message>
Update slides for Week 2
</commit_message>
<xml_diff>
--- a/bayesian_statistics_slides.pptx
+++ b/bayesian_statistics_slides.pptx
@@ -28,8 +28,8 @@
     <p:sldId id="367" r:id="rId22"/>
     <p:sldId id="372" r:id="rId23"/>
     <p:sldId id="368" r:id="rId24"/>
-    <p:sldId id="343" r:id="rId25"/>
-    <p:sldId id="353" r:id="rId26"/>
+    <p:sldId id="353" r:id="rId25"/>
+    <p:sldId id="343" r:id="rId26"/>
     <p:sldId id="350" r:id="rId27"/>
     <p:sldId id="348" r:id="rId28"/>
   </p:sldIdLst>
@@ -220,7 +220,7 @@
           <a:p>
             <a:fld id="{5783EF70-B160-C544-A096-4290244F455F}" type="datetimeFigureOut">
               <a:rPr lang="en-US" smtClean="0"/>
-              <a:t>4/16/2024</a:t>
+              <a:t>3/24/2025</a:t>
             </a:fld>
             <a:endParaRPr lang="en-US"/>
           </a:p>
@@ -1403,7 +1403,7 @@
           <a:p>
             <a:fld id="{5BC86E30-FAB4-5B4A-8975-63EB729CF3D6}" type="slidenum">
               <a:rPr lang="en-US" smtClean="0"/>
-              <a:t>21</a:t>
+              <a:t>22</a:t>
             </a:fld>
             <a:endParaRPr lang="en-US"/>
           </a:p>
@@ -2411,7 +2411,7 @@
           <a:p>
             <a:fld id="{C45D44A4-BF46-4784-BC3D-5888E1A8829D}" type="datetimeFigureOut">
               <a:rPr lang="en-GB" smtClean="0"/>
-              <a:t>16/04/2024</a:t>
+              <a:t>24/03/2025</a:t>
             </a:fld>
             <a:endParaRPr lang="en-GB"/>
           </a:p>
@@ -2581,7 +2581,7 @@
           <a:p>
             <a:fld id="{C45D44A4-BF46-4784-BC3D-5888E1A8829D}" type="datetimeFigureOut">
               <a:rPr lang="en-GB" smtClean="0"/>
-              <a:t>16/04/2024</a:t>
+              <a:t>24/03/2025</a:t>
             </a:fld>
             <a:endParaRPr lang="en-GB"/>
           </a:p>
@@ -2761,7 +2761,7 @@
           <a:p>
             <a:fld id="{C45D44A4-BF46-4784-BC3D-5888E1A8829D}" type="datetimeFigureOut">
               <a:rPr lang="en-GB" smtClean="0"/>
-              <a:t>16/04/2024</a:t>
+              <a:t>24/03/2025</a:t>
             </a:fld>
             <a:endParaRPr lang="en-GB"/>
           </a:p>
@@ -2936,7 +2936,7 @@
           <a:p>
             <a:fld id="{C45D44A4-BF46-4784-BC3D-5888E1A8829D}" type="datetimeFigureOut">
               <a:rPr lang="en-GB" smtClean="0"/>
-              <a:t>16/04/2024</a:t>
+              <a:t>24/03/2025</a:t>
             </a:fld>
             <a:endParaRPr lang="en-GB"/>
           </a:p>
@@ -3182,7 +3182,7 @@
           <a:p>
             <a:fld id="{C45D44A4-BF46-4784-BC3D-5888E1A8829D}" type="datetimeFigureOut">
               <a:rPr lang="en-GB" smtClean="0"/>
-              <a:t>16/04/2024</a:t>
+              <a:t>24/03/2025</a:t>
             </a:fld>
             <a:endParaRPr lang="en-GB"/>
           </a:p>
@@ -3414,7 +3414,7 @@
           <a:p>
             <a:fld id="{C45D44A4-BF46-4784-BC3D-5888E1A8829D}" type="datetimeFigureOut">
               <a:rPr lang="en-GB" smtClean="0"/>
-              <a:t>16/04/2024</a:t>
+              <a:t>24/03/2025</a:t>
             </a:fld>
             <a:endParaRPr lang="en-GB"/>
           </a:p>
@@ -3781,7 +3781,7 @@
           <a:p>
             <a:fld id="{C45D44A4-BF46-4784-BC3D-5888E1A8829D}" type="datetimeFigureOut">
               <a:rPr lang="en-GB" smtClean="0"/>
-              <a:t>16/04/2024</a:t>
+              <a:t>24/03/2025</a:t>
             </a:fld>
             <a:endParaRPr lang="en-GB"/>
           </a:p>
@@ -3880,7 +3880,7 @@
           <a:p>
             <a:fld id="{C45D44A4-BF46-4784-BC3D-5888E1A8829D}" type="datetimeFigureOut">
               <a:rPr lang="en-GB" smtClean="0"/>
-              <a:t>16/04/2024</a:t>
+              <a:t>24/03/2025</a:t>
             </a:fld>
             <a:endParaRPr lang="en-GB"/>
           </a:p>
@@ -3975,7 +3975,7 @@
           <a:p>
             <a:fld id="{C45D44A4-BF46-4784-BC3D-5888E1A8829D}" type="datetimeFigureOut">
               <a:rPr lang="en-GB" smtClean="0"/>
-              <a:t>16/04/2024</a:t>
+              <a:t>24/03/2025</a:t>
             </a:fld>
             <a:endParaRPr lang="en-GB"/>
           </a:p>
@@ -4252,7 +4252,7 @@
           <a:p>
             <a:fld id="{C45D44A4-BF46-4784-BC3D-5888E1A8829D}" type="datetimeFigureOut">
               <a:rPr lang="en-GB" smtClean="0"/>
-              <a:t>16/04/2024</a:t>
+              <a:t>24/03/2025</a:t>
             </a:fld>
             <a:endParaRPr lang="en-GB"/>
           </a:p>
@@ -4505,7 +4505,7 @@
           <a:p>
             <a:fld id="{C45D44A4-BF46-4784-BC3D-5888E1A8829D}" type="datetimeFigureOut">
               <a:rPr lang="en-GB" smtClean="0"/>
-              <a:t>16/04/2024</a:t>
+              <a:t>24/03/2025</a:t>
             </a:fld>
             <a:endParaRPr lang="en-GB"/>
           </a:p>
@@ -4718,7 +4718,7 @@
           <a:p>
             <a:fld id="{C45D44A4-BF46-4784-BC3D-5888E1A8829D}" type="datetimeFigureOut">
               <a:rPr lang="en-GB" smtClean="0"/>
-              <a:t>16/04/2024</a:t>
+              <a:t>24/03/2025</a:t>
             </a:fld>
             <a:endParaRPr lang="en-GB"/>
           </a:p>
@@ -14291,207 +14291,6 @@
       </p:grpSpPr>
       <p:sp>
         <p:nvSpPr>
-          <p:cNvPr id="2" name="Title 1">
-            <a:extLst>
-              <a:ext uri="{FF2B5EF4-FFF2-40B4-BE49-F238E27FC236}">
-                <a16:creationId xmlns:a16="http://schemas.microsoft.com/office/drawing/2014/main" id="{7DBBEFCB-8C02-C9D0-3864-36BA1C00C082}"/>
-              </a:ext>
-            </a:extLst>
-          </p:cNvPr>
-          <p:cNvSpPr>
-            <a:spLocks noGrp="1"/>
-          </p:cNvSpPr>
-          <p:nvPr>
-            <p:ph type="title"/>
-          </p:nvPr>
-        </p:nvSpPr>
-        <p:spPr/>
-        <p:txBody>
-          <a:bodyPr>
-            <a:normAutofit/>
-          </a:bodyPr>
-          <a:lstStyle/>
-          <a:p>
-            <a:r>
-              <a:rPr lang="en-GB" sz="4800" b="1" dirty="0">
-                <a:solidFill>
-                  <a:schemeClr val="accent5">
-                    <a:lumMod val="50000"/>
-                  </a:schemeClr>
-                </a:solidFill>
-                <a:latin typeface="Source Sans Pro"/>
-                <a:ea typeface="Source Sans Pro"/>
-                <a:cs typeface="Calibri"/>
-              </a:rPr>
-              <a:t>Plan for next week</a:t>
-            </a:r>
-            <a:endParaRPr lang="en-US" dirty="0"/>
-          </a:p>
-        </p:txBody>
-      </p:sp>
-      <p:sp>
-        <p:nvSpPr>
-          <p:cNvPr id="3" name="Content Placeholder 2">
-            <a:extLst>
-              <a:ext uri="{FF2B5EF4-FFF2-40B4-BE49-F238E27FC236}">
-                <a16:creationId xmlns:a16="http://schemas.microsoft.com/office/drawing/2014/main" id="{064CB00B-665E-3D06-08F3-BD715E485C30}"/>
-              </a:ext>
-            </a:extLst>
-          </p:cNvPr>
-          <p:cNvSpPr>
-            <a:spLocks noGrp="1"/>
-          </p:cNvSpPr>
-          <p:nvPr>
-            <p:ph idx="1"/>
-          </p:nvPr>
-        </p:nvSpPr>
-        <p:spPr>
-          <a:xfrm>
-            <a:off x="838200" y="1718049"/>
-            <a:ext cx="10515600" cy="4030107"/>
-          </a:xfrm>
-        </p:spPr>
-        <p:txBody>
-          <a:bodyPr>
-            <a:normAutofit/>
-          </a:bodyPr>
-          <a:lstStyle/>
-          <a:p>
-            <a:pPr>
-              <a:spcAft>
-                <a:spcPts val="600"/>
-              </a:spcAft>
-            </a:pPr>
-            <a:r>
-              <a:rPr lang="en-US" sz="2800" dirty="0">
-                <a:latin typeface="Source Sans Pro" panose="020B0503030403020204" pitchFamily="34" charset="0"/>
-                <a:ea typeface="Source Sans Pro" panose="020B0503030403020204" pitchFamily="34" charset="0"/>
-              </a:rPr>
-              <a:t>The model-building workflow:</a:t>
-            </a:r>
-          </a:p>
-          <a:p>
-            <a:pPr lvl="1">
-              <a:spcAft>
-                <a:spcPts val="600"/>
-              </a:spcAft>
-            </a:pPr>
-            <a:r>
-              <a:rPr lang="en-US" dirty="0"/>
-              <a:t>Finding a likelihood function</a:t>
-            </a:r>
-          </a:p>
-          <a:p>
-            <a:pPr lvl="1">
-              <a:spcAft>
-                <a:spcPts val="600"/>
-              </a:spcAft>
-            </a:pPr>
-            <a:r>
-              <a:rPr lang="en-US" dirty="0"/>
-              <a:t>Identifying parameters required by the likelihood </a:t>
-            </a:r>
-            <a:br>
-              <a:rPr lang="en-US" dirty="0"/>
-            </a:br>
-            <a:r>
-              <a:rPr lang="en-US" dirty="0"/>
-              <a:t>and your research question</a:t>
-            </a:r>
-          </a:p>
-          <a:p>
-            <a:pPr lvl="1">
-              <a:spcAft>
-                <a:spcPts val="600"/>
-              </a:spcAft>
-            </a:pPr>
-            <a:r>
-              <a:rPr lang="en-US" dirty="0">
-                <a:latin typeface="Source Sans Pro" panose="020B0503030403020204" pitchFamily="34" charset="0"/>
-                <a:ea typeface="Source Sans Pro" panose="020B0503030403020204" pitchFamily="34" charset="0"/>
-              </a:rPr>
-              <a:t>C</a:t>
-            </a:r>
-            <a:r>
-              <a:rPr lang="en-US" dirty="0"/>
-              <a:t>hoosing priors for those parameters</a:t>
-            </a:r>
-            <a:endParaRPr lang="en-US" dirty="0">
-              <a:latin typeface="Source Sans Pro" panose="020B0503030403020204" pitchFamily="34" charset="0"/>
-              <a:ea typeface="Source Sans Pro" panose="020B0503030403020204" pitchFamily="34" charset="0"/>
-            </a:endParaRPr>
-          </a:p>
-          <a:p>
-            <a:pPr>
-              <a:spcAft>
-                <a:spcPts val="600"/>
-              </a:spcAft>
-            </a:pPr>
-            <a:r>
-              <a:rPr lang="en-US" dirty="0"/>
-              <a:t>Fitting and inspecting models</a:t>
-            </a:r>
-          </a:p>
-          <a:p>
-            <a:pPr>
-              <a:spcAft>
-                <a:spcPts val="600"/>
-              </a:spcAft>
-            </a:pPr>
-            <a:r>
-              <a:rPr lang="en-US" dirty="0"/>
-              <a:t>Interpreting and reporting model results</a:t>
-            </a:r>
-            <a:endParaRPr lang="en-US" sz="2800" dirty="0">
-              <a:latin typeface="Source Sans Pro" panose="020B0503030403020204" pitchFamily="34" charset="0"/>
-              <a:ea typeface="Source Sans Pro" panose="020B0503030403020204" pitchFamily="34" charset="0"/>
-            </a:endParaRPr>
-          </a:p>
-          <a:p>
-            <a:pPr>
-              <a:spcAft>
-                <a:spcPts val="600"/>
-              </a:spcAft>
-            </a:pPr>
-            <a:endParaRPr lang="en-US" sz="2800" dirty="0">
-              <a:latin typeface="Source Sans Pro" panose="020B0503030403020204" pitchFamily="34" charset="0"/>
-              <a:ea typeface="Source Sans Pro" panose="020B0503030403020204" pitchFamily="34" charset="0"/>
-            </a:endParaRPr>
-          </a:p>
-        </p:txBody>
-      </p:sp>
-    </p:spTree>
-    <p:extLst>
-      <p:ext uri="{BB962C8B-B14F-4D97-AF65-F5344CB8AC3E}">
-        <p14:creationId xmlns:p14="http://schemas.microsoft.com/office/powerpoint/2010/main" val="1080753041"/>
-      </p:ext>
-    </p:extLst>
-  </p:cSld>
-  <p:clrMapOvr>
-    <a:masterClrMapping/>
-  </p:clrMapOvr>
-</p:sld>
-</file>
-
-<file path=ppt/slides/slide22.xml><?xml version="1.0" encoding="utf-8"?>
-<p:sld xmlns:a="http://schemas.openxmlformats.org/drawingml/2006/main" xmlns:r="http://schemas.openxmlformats.org/officeDocument/2006/relationships" xmlns:p="http://schemas.openxmlformats.org/presentationml/2006/main">
-  <p:cSld>
-    <p:spTree>
-      <p:nvGrpSpPr>
-        <p:cNvPr id="1" name=""/>
-        <p:cNvGrpSpPr/>
-        <p:nvPr/>
-      </p:nvGrpSpPr>
-      <p:grpSpPr>
-        <a:xfrm>
-          <a:off x="0" y="0"/>
-          <a:ext cx="0" cy="0"/>
-          <a:chOff x="0" y="0"/>
-          <a:chExt cx="0" cy="0"/>
-        </a:xfrm>
-      </p:grpSpPr>
-      <p:sp>
-        <p:nvSpPr>
           <p:cNvPr id="4" name="TextBox 3">
             <a:extLst>
               <a:ext uri="{FF2B5EF4-FFF2-40B4-BE49-F238E27FC236}">
@@ -14628,6 +14427,207 @@
 </p:sld>
 </file>
 
+<file path=ppt/slides/slide22.xml><?xml version="1.0" encoding="utf-8"?>
+<p:sld xmlns:a="http://schemas.openxmlformats.org/drawingml/2006/main" xmlns:r="http://schemas.openxmlformats.org/officeDocument/2006/relationships" xmlns:p="http://schemas.openxmlformats.org/presentationml/2006/main">
+  <p:cSld>
+    <p:spTree>
+      <p:nvGrpSpPr>
+        <p:cNvPr id="1" name=""/>
+        <p:cNvGrpSpPr/>
+        <p:nvPr/>
+      </p:nvGrpSpPr>
+      <p:grpSpPr>
+        <a:xfrm>
+          <a:off x="0" y="0"/>
+          <a:ext cx="0" cy="0"/>
+          <a:chOff x="0" y="0"/>
+          <a:chExt cx="0" cy="0"/>
+        </a:xfrm>
+      </p:grpSpPr>
+      <p:sp>
+        <p:nvSpPr>
+          <p:cNvPr id="2" name="Title 1">
+            <a:extLst>
+              <a:ext uri="{FF2B5EF4-FFF2-40B4-BE49-F238E27FC236}">
+                <a16:creationId xmlns:a16="http://schemas.microsoft.com/office/drawing/2014/main" id="{7DBBEFCB-8C02-C9D0-3864-36BA1C00C082}"/>
+              </a:ext>
+            </a:extLst>
+          </p:cNvPr>
+          <p:cNvSpPr>
+            <a:spLocks noGrp="1"/>
+          </p:cNvSpPr>
+          <p:nvPr>
+            <p:ph type="title"/>
+          </p:nvPr>
+        </p:nvSpPr>
+        <p:spPr/>
+        <p:txBody>
+          <a:bodyPr>
+            <a:normAutofit/>
+          </a:bodyPr>
+          <a:lstStyle/>
+          <a:p>
+            <a:r>
+              <a:rPr lang="en-GB" sz="4800" b="1" dirty="0">
+                <a:solidFill>
+                  <a:schemeClr val="accent5">
+                    <a:lumMod val="50000"/>
+                  </a:schemeClr>
+                </a:solidFill>
+                <a:latin typeface="Source Sans Pro"/>
+                <a:ea typeface="Source Sans Pro"/>
+                <a:cs typeface="Calibri"/>
+              </a:rPr>
+              <a:t>Plan for this week</a:t>
+            </a:r>
+            <a:endParaRPr lang="en-US" dirty="0"/>
+          </a:p>
+        </p:txBody>
+      </p:sp>
+      <p:sp>
+        <p:nvSpPr>
+          <p:cNvPr id="3" name="Content Placeholder 2">
+            <a:extLst>
+              <a:ext uri="{FF2B5EF4-FFF2-40B4-BE49-F238E27FC236}">
+                <a16:creationId xmlns:a16="http://schemas.microsoft.com/office/drawing/2014/main" id="{064CB00B-665E-3D06-08F3-BD715E485C30}"/>
+              </a:ext>
+            </a:extLst>
+          </p:cNvPr>
+          <p:cNvSpPr>
+            <a:spLocks noGrp="1"/>
+          </p:cNvSpPr>
+          <p:nvPr>
+            <p:ph idx="1"/>
+          </p:nvPr>
+        </p:nvSpPr>
+        <p:spPr>
+          <a:xfrm>
+            <a:off x="838200" y="1718049"/>
+            <a:ext cx="10515600" cy="4030107"/>
+          </a:xfrm>
+        </p:spPr>
+        <p:txBody>
+          <a:bodyPr>
+            <a:normAutofit/>
+          </a:bodyPr>
+          <a:lstStyle/>
+          <a:p>
+            <a:pPr>
+              <a:spcAft>
+                <a:spcPts val="600"/>
+              </a:spcAft>
+            </a:pPr>
+            <a:r>
+              <a:rPr lang="en-US" sz="2800" dirty="0">
+                <a:latin typeface="Source Sans Pro" panose="020B0503030403020204" pitchFamily="34" charset="0"/>
+                <a:ea typeface="Source Sans Pro" panose="020B0503030403020204" pitchFamily="34" charset="0"/>
+              </a:rPr>
+              <a:t>The model-building workflow:</a:t>
+            </a:r>
+          </a:p>
+          <a:p>
+            <a:pPr lvl="1">
+              <a:spcAft>
+                <a:spcPts val="600"/>
+              </a:spcAft>
+            </a:pPr>
+            <a:r>
+              <a:rPr lang="en-US" dirty="0"/>
+              <a:t>Finding a likelihood function</a:t>
+            </a:r>
+          </a:p>
+          <a:p>
+            <a:pPr lvl="1">
+              <a:spcAft>
+                <a:spcPts val="600"/>
+              </a:spcAft>
+            </a:pPr>
+            <a:r>
+              <a:rPr lang="en-US" dirty="0"/>
+              <a:t>Identifying parameters required by the likelihood </a:t>
+            </a:r>
+            <a:br>
+              <a:rPr lang="en-US" dirty="0"/>
+            </a:br>
+            <a:r>
+              <a:rPr lang="en-US" dirty="0"/>
+              <a:t>and your research question</a:t>
+            </a:r>
+          </a:p>
+          <a:p>
+            <a:pPr lvl="1">
+              <a:spcAft>
+                <a:spcPts val="600"/>
+              </a:spcAft>
+            </a:pPr>
+            <a:r>
+              <a:rPr lang="en-US" dirty="0">
+                <a:latin typeface="Source Sans Pro" panose="020B0503030403020204" pitchFamily="34" charset="0"/>
+                <a:ea typeface="Source Sans Pro" panose="020B0503030403020204" pitchFamily="34" charset="0"/>
+              </a:rPr>
+              <a:t>C</a:t>
+            </a:r>
+            <a:r>
+              <a:rPr lang="en-US" dirty="0"/>
+              <a:t>hoosing priors for those parameters</a:t>
+            </a:r>
+            <a:endParaRPr lang="en-US" dirty="0">
+              <a:latin typeface="Source Sans Pro" panose="020B0503030403020204" pitchFamily="34" charset="0"/>
+              <a:ea typeface="Source Sans Pro" panose="020B0503030403020204" pitchFamily="34" charset="0"/>
+            </a:endParaRPr>
+          </a:p>
+          <a:p>
+            <a:pPr>
+              <a:spcAft>
+                <a:spcPts val="600"/>
+              </a:spcAft>
+            </a:pPr>
+            <a:r>
+              <a:rPr lang="en-US" dirty="0"/>
+              <a:t>Fitting and inspecting models</a:t>
+            </a:r>
+          </a:p>
+          <a:p>
+            <a:pPr>
+              <a:spcAft>
+                <a:spcPts val="600"/>
+              </a:spcAft>
+            </a:pPr>
+            <a:r>
+              <a:rPr lang="en-US" dirty="0"/>
+              <a:t>Interpreting and reporting model results</a:t>
+            </a:r>
+            <a:endParaRPr lang="en-US" sz="2800" dirty="0">
+              <a:latin typeface="Source Sans Pro" panose="020B0503030403020204" pitchFamily="34" charset="0"/>
+              <a:ea typeface="Source Sans Pro" panose="020B0503030403020204" pitchFamily="34" charset="0"/>
+            </a:endParaRPr>
+          </a:p>
+          <a:p>
+            <a:pPr>
+              <a:spcAft>
+                <a:spcPts val="600"/>
+              </a:spcAft>
+            </a:pPr>
+            <a:endParaRPr lang="en-US" sz="2800" dirty="0">
+              <a:latin typeface="Source Sans Pro" panose="020B0503030403020204" pitchFamily="34" charset="0"/>
+              <a:ea typeface="Source Sans Pro" panose="020B0503030403020204" pitchFamily="34" charset="0"/>
+            </a:endParaRPr>
+          </a:p>
+        </p:txBody>
+      </p:sp>
+    </p:spTree>
+    <p:extLst>
+      <p:ext uri="{BB962C8B-B14F-4D97-AF65-F5344CB8AC3E}">
+        <p14:creationId xmlns:p14="http://schemas.microsoft.com/office/powerpoint/2010/main" val="1080753041"/>
+      </p:ext>
+    </p:extLst>
+  </p:cSld>
+  <p:clrMapOvr>
+    <a:masterClrMapping/>
+  </p:clrMapOvr>
+</p:sld>
+</file>
+
 <file path=ppt/slides/slide23.xml><?xml version="1.0" encoding="utf-8"?>
 <p:sld xmlns:a="http://schemas.openxmlformats.org/drawingml/2006/main" xmlns:r="http://schemas.openxmlformats.org/officeDocument/2006/relationships" xmlns:p="http://schemas.openxmlformats.org/presentationml/2006/main">
   <p:cSld>
@@ -15046,7 +15046,7 @@
                 <a:latin typeface="Source Sans Pro"/>
                 <a:ea typeface="Source Sans Pro"/>
               </a:rPr>
-              <a:t>Feel free to post in the Teams group if you’re still working through the practical and need any help</a:t>
+              <a:t>Feel free to post in the Teams chat if you’re still working through the practical and need any help</a:t>
             </a:r>
           </a:p>
           <a:p>
@@ -18793,18 +18793,18 @@
 </file>
 
 <file path=customXml/item2.xml><?xml version="1.0" encoding="utf-8"?>
+<p:properties xmlns:p="http://schemas.microsoft.com/office/2006/metadata/properties" xmlns:xsi="http://www.w3.org/2001/XMLSchema-instance" xmlns:pc="http://schemas.microsoft.com/office/infopath/2007/PartnerControls">
+  <documentManagement/>
+</p:properties>
+</file>
+
+<file path=customXml/item3.xml><?xml version="1.0" encoding="utf-8"?>
 <?mso-contentType ?>
 <FormTemplates xmlns="http://schemas.microsoft.com/sharepoint/v3/contenttype/forms">
   <Display>DocumentLibraryForm</Display>
   <Edit>DocumentLibraryForm</Edit>
   <New>DocumentLibraryForm</New>
 </FormTemplates>
-</file>
-
-<file path=customXml/item3.xml><?xml version="1.0" encoding="utf-8"?>
-<p:properties xmlns:p="http://schemas.microsoft.com/office/2006/metadata/properties" xmlns:xsi="http://www.w3.org/2001/XMLSchema-instance" xmlns:pc="http://schemas.microsoft.com/office/infopath/2007/PartnerControls">
-  <documentManagement/>
-</p:properties>
 </file>
 
 <file path=customXml/itemProps1.xml><?xml version="1.0" encoding="utf-8"?>
@@ -18826,14 +18826,6 @@
 </file>
 
 <file path=customXml/itemProps2.xml><?xml version="1.0" encoding="utf-8"?>
-<ds:datastoreItem xmlns:ds="http://schemas.openxmlformats.org/officeDocument/2006/customXml" ds:itemID="{00170929-63CF-426D-951F-B184E207E292}">
-  <ds:schemaRefs>
-    <ds:schemaRef ds:uri="http://schemas.microsoft.com/sharepoint/v3/contenttype/forms"/>
-  </ds:schemaRefs>
-</ds:datastoreItem>
-</file>
-
-<file path=customXml/itemProps3.xml><?xml version="1.0" encoding="utf-8"?>
 <ds:datastoreItem xmlns:ds="http://schemas.openxmlformats.org/officeDocument/2006/customXml" ds:itemID="{E104A45D-6F6A-421C-AA7B-39DFAA25A296}">
   <ds:schemaRefs>
     <ds:schemaRef ds:uri="http://purl.org/dc/terms/"/>
@@ -18847,4 +18839,12 @@
     <ds:schemaRef ds:uri="http://purl.org/dc/dcmitype/"/>
   </ds:schemaRefs>
 </ds:datastoreItem>
+</file>
+
+<file path=customXml/itemProps3.xml><?xml version="1.0" encoding="utf-8"?>
+<ds:datastoreItem xmlns:ds="http://schemas.openxmlformats.org/officeDocument/2006/customXml" ds:itemID="{00170929-63CF-426D-951F-B184E207E292}">
+  <ds:schemaRefs>
+    <ds:schemaRef ds:uri="http://schemas.microsoft.com/sharepoint/v3/contenttype/forms"/>
+  </ds:schemaRefs>
+</ds:datastoreItem>
 </file>
</xml_diff>